<commit_message>
Pictures and complete ppt
</commit_message>
<xml_diff>
--- a/KBEpresentation.pptx
+++ b/KBEpresentation.pptx
@@ -1875,17 +1875,189 @@
               </a:rPr>
               <a:t>Tail generation capabilities</a:t>
             </a:r>
-            <a:endParaRPr lang="en-US" sz="3600" dirty="0" smtClean="0">
-              <a:solidFill>
-                <a:srgbClr val="00A6D6"/>
-              </a:solidFill>
-              <a:latin typeface="Arial"/>
-              <a:ea typeface="MS PGothic" charset="0"/>
-              <a:cs typeface="Arial"/>
-            </a:endParaRPr>
           </a:p>
         </p:txBody>
       </p:sp>
+      <p:pic>
+        <p:nvPicPr>
+          <p:cNvPr id="4" name="Picture 3"/>
+          <p:cNvPicPr>
+            <a:picLocks noChangeAspect="1"/>
+          </p:cNvPicPr>
+          <p:nvPr/>
+        </p:nvPicPr>
+        <p:blipFill>
+          <a:blip r:embed="rId2">
+            <a:extLst>
+              <a:ext uri="{28A0092B-C50C-407E-A947-70E740481C1C}">
+                <a14:useLocalDpi xmlns:a14="http://schemas.microsoft.com/office/drawing/2010/main" val="0"/>
+              </a:ext>
+            </a:extLst>
+          </a:blip>
+          <a:stretch>
+            <a:fillRect/>
+          </a:stretch>
+        </p:blipFill>
+        <p:spPr>
+          <a:xfrm>
+            <a:off x="0" y="1010415"/>
+            <a:ext cx="2827283" cy="2424396"/>
+          </a:xfrm>
+          <a:prstGeom prst="rect">
+            <a:avLst/>
+          </a:prstGeom>
+        </p:spPr>
+      </p:pic>
+      <p:pic>
+        <p:nvPicPr>
+          <p:cNvPr id="5" name="Picture 4"/>
+          <p:cNvPicPr>
+            <a:picLocks noChangeAspect="1"/>
+          </p:cNvPicPr>
+          <p:nvPr/>
+        </p:nvPicPr>
+        <p:blipFill>
+          <a:blip r:embed="rId3">
+            <a:extLst>
+              <a:ext uri="{28A0092B-C50C-407E-A947-70E740481C1C}">
+                <a14:useLocalDpi xmlns:a14="http://schemas.microsoft.com/office/drawing/2010/main" val="0"/>
+              </a:ext>
+            </a:extLst>
+          </a:blip>
+          <a:stretch>
+            <a:fillRect/>
+          </a:stretch>
+        </p:blipFill>
+        <p:spPr>
+          <a:xfrm>
+            <a:off x="2831810" y="1209065"/>
+            <a:ext cx="3040643" cy="2202371"/>
+          </a:xfrm>
+          <a:prstGeom prst="rect">
+            <a:avLst/>
+          </a:prstGeom>
+        </p:spPr>
+      </p:pic>
+      <p:pic>
+        <p:nvPicPr>
+          <p:cNvPr id="7" name="Picture 6"/>
+          <p:cNvPicPr>
+            <a:picLocks noChangeAspect="1"/>
+          </p:cNvPicPr>
+          <p:nvPr/>
+        </p:nvPicPr>
+        <p:blipFill>
+          <a:blip r:embed="rId4">
+            <a:extLst>
+              <a:ext uri="{28A0092B-C50C-407E-A947-70E740481C1C}">
+                <a14:useLocalDpi xmlns:a14="http://schemas.microsoft.com/office/drawing/2010/main" val="0"/>
+              </a:ext>
+            </a:extLst>
+          </a:blip>
+          <a:stretch>
+            <a:fillRect/>
+          </a:stretch>
+        </p:blipFill>
+        <p:spPr>
+          <a:xfrm>
+            <a:off x="5872453" y="3499074"/>
+            <a:ext cx="3040643" cy="2400508"/>
+          </a:xfrm>
+          <a:prstGeom prst="rect">
+            <a:avLst/>
+          </a:prstGeom>
+        </p:spPr>
+      </p:pic>
+      <p:pic>
+        <p:nvPicPr>
+          <p:cNvPr id="8" name="Picture 7"/>
+          <p:cNvPicPr>
+            <a:picLocks noChangeAspect="1"/>
+          </p:cNvPicPr>
+          <p:nvPr/>
+        </p:nvPicPr>
+        <p:blipFill>
+          <a:blip r:embed="rId5">
+            <a:extLst>
+              <a:ext uri="{28A0092B-C50C-407E-A947-70E740481C1C}">
+                <a14:useLocalDpi xmlns:a14="http://schemas.microsoft.com/office/drawing/2010/main" val="0"/>
+              </a:ext>
+            </a:extLst>
+          </a:blip>
+          <a:stretch>
+            <a:fillRect/>
+          </a:stretch>
+        </p:blipFill>
+        <p:spPr>
+          <a:xfrm>
+            <a:off x="5798530" y="1121428"/>
+            <a:ext cx="3345470" cy="2377646"/>
+          </a:xfrm>
+          <a:prstGeom prst="rect">
+            <a:avLst/>
+          </a:prstGeom>
+        </p:spPr>
+      </p:pic>
+      <p:pic>
+        <p:nvPicPr>
+          <p:cNvPr id="6" name="Picture 5"/>
+          <p:cNvPicPr>
+            <a:picLocks noChangeAspect="1"/>
+          </p:cNvPicPr>
+          <p:nvPr/>
+        </p:nvPicPr>
+        <p:blipFill>
+          <a:blip r:embed="rId6">
+            <a:extLst>
+              <a:ext uri="{28A0092B-C50C-407E-A947-70E740481C1C}">
+                <a14:useLocalDpi xmlns:a14="http://schemas.microsoft.com/office/drawing/2010/main" val="0"/>
+              </a:ext>
+            </a:extLst>
+          </a:blip>
+          <a:stretch>
+            <a:fillRect/>
+          </a:stretch>
+        </p:blipFill>
+        <p:spPr>
+          <a:xfrm>
+            <a:off x="2865120" y="3571188"/>
+            <a:ext cx="3179488" cy="2256277"/>
+          </a:xfrm>
+          <a:prstGeom prst="rect">
+            <a:avLst/>
+          </a:prstGeom>
+        </p:spPr>
+      </p:pic>
+      <p:pic>
+        <p:nvPicPr>
+          <p:cNvPr id="9" name="Picture 8"/>
+          <p:cNvPicPr>
+            <a:picLocks noChangeAspect="1"/>
+          </p:cNvPicPr>
+          <p:nvPr/>
+        </p:nvPicPr>
+        <p:blipFill>
+          <a:blip r:embed="rId7">
+            <a:extLst>
+              <a:ext uri="{28A0092B-C50C-407E-A947-70E740481C1C}">
+                <a14:useLocalDpi xmlns:a14="http://schemas.microsoft.com/office/drawing/2010/main" val="0"/>
+              </a:ext>
+            </a:extLst>
+          </a:blip>
+          <a:stretch>
+            <a:fillRect/>
+          </a:stretch>
+        </p:blipFill>
+        <p:spPr>
+          <a:xfrm>
+            <a:off x="0" y="3405818"/>
+            <a:ext cx="3128144" cy="2587019"/>
+          </a:xfrm>
+          <a:prstGeom prst="rect">
+            <a:avLst/>
+          </a:prstGeom>
+        </p:spPr>
+      </p:pic>
     </p:spTree>
     <p:extLst>
       <p:ext uri="{BB962C8B-B14F-4D97-AF65-F5344CB8AC3E}">
@@ -2323,14 +2495,6 @@
               </a:rPr>
               <a:t>Output capabilities</a:t>
             </a:r>
-            <a:endParaRPr lang="en-US" sz="3600" dirty="0" smtClean="0">
-              <a:solidFill>
-                <a:srgbClr val="00A6D6"/>
-              </a:solidFill>
-              <a:latin typeface="Arial"/>
-              <a:ea typeface="MS PGothic" charset="0"/>
-              <a:cs typeface="Arial"/>
-            </a:endParaRPr>
           </a:p>
         </p:txBody>
       </p:sp>
@@ -2594,14 +2758,6 @@
               </a:rPr>
               <a:t>Code Structure</a:t>
             </a:r>
-            <a:endParaRPr lang="en-US" sz="3600" dirty="0" smtClean="0">
-              <a:solidFill>
-                <a:srgbClr val="00A6D6"/>
-              </a:solidFill>
-              <a:latin typeface="Arial"/>
-              <a:ea typeface="MS PGothic" charset="0"/>
-              <a:cs typeface="Arial"/>
-            </a:endParaRPr>
           </a:p>
         </p:txBody>
       </p:sp>
@@ -3447,14 +3603,6 @@
               </a:rPr>
               <a:t>Continue to Tasty</a:t>
             </a:r>
-            <a:endParaRPr lang="en-US" sz="3600" dirty="0" smtClean="0">
-              <a:solidFill>
-                <a:srgbClr val="00A6D6"/>
-              </a:solidFill>
-              <a:latin typeface="Arial"/>
-              <a:ea typeface="MS PGothic" charset="0"/>
-              <a:cs typeface="Arial"/>
-            </a:endParaRPr>
           </a:p>
         </p:txBody>
       </p:sp>

</xml_diff>